<commit_message>
made points more concise
</commit_message>
<xml_diff>
--- a/Documentation/eXchains.pptx
+++ b/Documentation/eXchains.pptx
@@ -1460,6 +1460,109 @@
           <a:bodyPr/>
           <a:lstStyle/>
           <a:p>
+            <a:pPr marL="0" marR="0" lvl="0" indent="0" algn="l" defTabSz="914400" rtl="0" eaLnBrk="1" fontAlgn="auto" latinLnBrk="0" hangingPunct="1">
+              <a:lnSpc>
+                <a:spcPct val="100000"/>
+              </a:lnSpc>
+              <a:spcBef>
+                <a:spcPts val="0"/>
+              </a:spcBef>
+              <a:spcAft>
+                <a:spcPts val="0"/>
+              </a:spcAft>
+              <a:buClrTx/>
+              <a:buSzTx/>
+              <a:buFontTx/>
+              <a:buNone/>
+              <a:tabLst/>
+              <a:defRPr/>
+            </a:pPr>
+            <a:r>
+              <a:rPr lang="en-US" dirty="0"/>
+              <a:t>Permissioned blockchain:</a:t>
+            </a:r>
+          </a:p>
+          <a:p>
+            <a:pPr marL="0" marR="0" lvl="0" indent="0" algn="l" defTabSz="914400" rtl="0" eaLnBrk="1" fontAlgn="auto" latinLnBrk="0" hangingPunct="1">
+              <a:lnSpc>
+                <a:spcPct val="100000"/>
+              </a:lnSpc>
+              <a:spcBef>
+                <a:spcPts val="0"/>
+              </a:spcBef>
+              <a:spcAft>
+                <a:spcPts val="0"/>
+              </a:spcAft>
+              <a:buClrTx/>
+              <a:buSzTx/>
+              <a:buFontTx/>
+              <a:buNone/>
+              <a:tabLst/>
+              <a:defRPr/>
+            </a:pPr>
+            <a:r>
+              <a:rPr lang="en-US" dirty="0"/>
+              <a:t>	The energy market is a highly regulated environment</a:t>
+            </a:r>
+          </a:p>
+          <a:p>
+            <a:endParaRPr lang="en-US" sz="1200" b="0" i="0" u="none" strike="noStrike" kern="1200" dirty="0">
+              <a:solidFill>
+                <a:schemeClr val="tx1"/>
+              </a:solidFill>
+              <a:effectLst/>
+              <a:latin typeface="+mn-lt"/>
+              <a:ea typeface="+mn-ea"/>
+              <a:cs typeface="+mn-cs"/>
+            </a:endParaRPr>
+          </a:p>
+          <a:p>
+            <a:pPr marL="0" marR="0" lvl="0" indent="0" algn="l" defTabSz="914400" rtl="0" eaLnBrk="1" fontAlgn="auto" latinLnBrk="0" hangingPunct="1">
+              <a:lnSpc>
+                <a:spcPct val="100000"/>
+              </a:lnSpc>
+              <a:spcBef>
+                <a:spcPts val="0"/>
+              </a:spcBef>
+              <a:spcAft>
+                <a:spcPts val="0"/>
+              </a:spcAft>
+              <a:buClrTx/>
+              <a:buSzTx/>
+              <a:buFontTx/>
+              <a:buNone/>
+              <a:tabLst/>
+              <a:defRPr/>
+            </a:pPr>
+            <a:r>
+              <a:rPr lang="en-US" dirty="0"/>
+              <a:t>Proof of stake:</a:t>
+            </a:r>
+          </a:p>
+          <a:p>
+            <a:pPr marL="0" marR="0" lvl="0" indent="0" algn="l" defTabSz="914400" rtl="0" eaLnBrk="1" fontAlgn="auto" latinLnBrk="0" hangingPunct="1">
+              <a:lnSpc>
+                <a:spcPct val="100000"/>
+              </a:lnSpc>
+              <a:spcBef>
+                <a:spcPts val="0"/>
+              </a:spcBef>
+              <a:spcAft>
+                <a:spcPts val="0"/>
+              </a:spcAft>
+              <a:buClrTx/>
+              <a:buSzTx/>
+              <a:buFontTx/>
+              <a:buNone/>
+              <a:tabLst/>
+              <a:defRPr/>
+            </a:pPr>
+            <a:r>
+              <a:rPr lang="en-US" dirty="0"/>
+              <a:t>	is more energy efficient and suitable for permissioned blockchain</a:t>
+            </a:r>
+          </a:p>
+          <a:p>
             <a:r>
               <a:rPr lang="en-US" sz="1200" b="0" i="0" u="none" strike="noStrike" kern="1200" dirty="0">
                 <a:solidFill>
@@ -1470,8 +1573,44 @@
                 <a:ea typeface="+mn-ea"/>
                 <a:cs typeface="+mn-cs"/>
               </a:rPr>
-              <a:t>Proof of stake (proof of work defies the purpose: waste energy to solve energy problems</a:t>
-            </a:r>
+              <a:t>	Proof of stake (proof of work defies the purpose: waste energy to solve energy problems</a:t>
+            </a:r>
+          </a:p>
+          <a:p>
+            <a:endParaRPr lang="en-US" sz="1200" b="0" i="0" u="none" strike="noStrike" kern="1200" dirty="0">
+              <a:solidFill>
+                <a:schemeClr val="tx1"/>
+              </a:solidFill>
+              <a:effectLst/>
+              <a:latin typeface="+mn-lt"/>
+              <a:ea typeface="+mn-ea"/>
+              <a:cs typeface="+mn-cs"/>
+            </a:endParaRPr>
+          </a:p>
+          <a:p>
+            <a:pPr marL="0" marR="0" lvl="0" indent="0" algn="l" defTabSz="914400" rtl="0" eaLnBrk="1" fontAlgn="auto" latinLnBrk="0" hangingPunct="1">
+              <a:lnSpc>
+                <a:spcPct val="100000"/>
+              </a:lnSpc>
+              <a:spcBef>
+                <a:spcPts val="0"/>
+              </a:spcBef>
+              <a:spcAft>
+                <a:spcPts val="0"/>
+              </a:spcAft>
+              <a:buClrTx/>
+              <a:buSzTx/>
+              <a:buFontTx/>
+              <a:buNone/>
+              <a:tabLst/>
+              <a:defRPr/>
+            </a:pPr>
+            <a:r>
+              <a:rPr lang="en-US" dirty="0"/>
+              <a:t>Tendermint is agnostic of application logic but has BFT consensus across validators and messaging implemented out of box</a:t>
+            </a:r>
+          </a:p>
+          <a:p>
             <a:endParaRPr lang="en-US" dirty="0"/>
           </a:p>
         </p:txBody>
@@ -11768,23 +11907,31 @@
           <a:p>
             <a:r>
               <a:rPr lang="en-US" dirty="0"/>
-              <a:t>Permissioned blockchain: The energy market is a highly regulated environment</a:t>
+              <a:t>Permissioned blockchain</a:t>
             </a:r>
           </a:p>
           <a:p>
             <a:r>
               <a:rPr lang="en-US" dirty="0"/>
-              <a:t>Proof of stake is more energy efficient and suitable for permissioned blockchain</a:t>
-            </a:r>
-          </a:p>
-          <a:p>
-            <a:r>
-              <a:rPr lang="en-US" dirty="0" err="1"/>
-              <a:t>Tendermint</a:t>
-            </a:r>
+              <a:t>Proof of stake</a:t>
+            </a:r>
+          </a:p>
+          <a:p>
             <a:r>
               <a:rPr lang="en-US" dirty="0"/>
-              <a:t> is agnostic of application logic but has BFT consensus across validators and messaging implemented out of box</a:t>
+              <a:t>Agnostic of application logic</a:t>
+            </a:r>
+          </a:p>
+          <a:p>
+            <a:r>
+              <a:rPr lang="en-US" dirty="0"/>
+              <a:t>BFT consensus across validators </a:t>
+            </a:r>
+          </a:p>
+          <a:p>
+            <a:r>
+              <a:rPr lang="en-US" dirty="0"/>
+              <a:t>Messaging implemented out of box</a:t>
             </a:r>
           </a:p>
           <a:p>

</xml_diff>

<commit_message>
added results slide to powerpoint
</commit_message>
<xml_diff>
--- a/Documentation/eXchains.pptx
+++ b/Documentation/eXchains.pptx
@@ -6,10 +6,10 @@
     <p:sldMasterId id="2147483660" r:id="rId2"/>
   </p:sldMasterIdLst>
   <p:notesMasterIdLst>
-    <p:notesMasterId r:id="rId14"/>
+    <p:notesMasterId r:id="rId15"/>
   </p:notesMasterIdLst>
   <p:handoutMasterIdLst>
-    <p:handoutMasterId r:id="rId15"/>
+    <p:handoutMasterId r:id="rId16"/>
   </p:handoutMasterIdLst>
   <p:sldIdLst>
     <p:sldId id="277" r:id="rId3"/>
@@ -21,8 +21,9 @@
     <p:sldId id="280" r:id="rId9"/>
     <p:sldId id="279" r:id="rId10"/>
     <p:sldId id="273" r:id="rId11"/>
-    <p:sldId id="274" r:id="rId12"/>
-    <p:sldId id="275" r:id="rId13"/>
+    <p:sldId id="281" r:id="rId12"/>
+    <p:sldId id="274" r:id="rId13"/>
+    <p:sldId id="275" r:id="rId14"/>
   </p:sldIdLst>
   <p:sldSz cx="9144000" cy="5143500" type="screen16x9"/>
   <p:notesSz cx="6858000" cy="9144000"/>
@@ -222,7 +223,7 @@
           <a:p>
             <a:fld id="{DBAE3B3E-782A-9745-8E84-372F7B6771BF}" type="datetimeFigureOut">
               <a:rPr lang="en-US" smtClean="0"/>
-              <a:t>2/18/2018</a:t>
+              <a:t>2/19/2018</a:t>
             </a:fld>
             <a:endParaRPr lang="en-US" dirty="0"/>
           </a:p>
@@ -387,7 +388,7 @@
           <a:p>
             <a:fld id="{BACFDF19-1C47-4F71-B80E-D5714F33FDD2}" type="datetimeFigureOut">
               <a:rPr lang="nl-NL" smtClean="0"/>
-              <a:t>18-2-2018</a:t>
+              <a:t>19-2-2018</a:t>
             </a:fld>
             <a:endParaRPr lang="nl-NL"/>
           </a:p>
@@ -2308,7 +2309,7 @@
           <a:p>
             <a:fld id="{462A2416-1570-3849-86F9-07F78746E1B2}" type="datetimeFigureOut">
               <a:rPr lang="en-US" smtClean="0"/>
-              <a:t>2/18/2018</a:t>
+              <a:t>2/19/2018</a:t>
             </a:fld>
             <a:endParaRPr lang="en-US" dirty="0"/>
           </a:p>
@@ -3768,6 +3769,110 @@
       </p:grpSpPr>
       <p:sp>
         <p:nvSpPr>
+          <p:cNvPr id="2" name="Title 1">
+            <a:extLst>
+              <a:ext uri="{FF2B5EF4-FFF2-40B4-BE49-F238E27FC236}">
+                <a16:creationId xmlns:a16="http://schemas.microsoft.com/office/drawing/2014/main" id="{3A10507A-BBB0-4E87-A85D-286E2E9E79EF}"/>
+              </a:ext>
+            </a:extLst>
+          </p:cNvPr>
+          <p:cNvSpPr>
+            <a:spLocks noGrp="1"/>
+          </p:cNvSpPr>
+          <p:nvPr>
+            <p:ph type="title"/>
+          </p:nvPr>
+        </p:nvSpPr>
+        <p:spPr/>
+        <p:txBody>
+          <a:bodyPr/>
+          <a:lstStyle/>
+          <a:p>
+            <a:r>
+              <a:rPr lang="en-US" dirty="0"/>
+              <a:t>Results:</a:t>
+            </a:r>
+          </a:p>
+        </p:txBody>
+      </p:sp>
+      <p:sp>
+        <p:nvSpPr>
+          <p:cNvPr id="3" name="Content Placeholder 2">
+            <a:extLst>
+              <a:ext uri="{FF2B5EF4-FFF2-40B4-BE49-F238E27FC236}">
+                <a16:creationId xmlns:a16="http://schemas.microsoft.com/office/drawing/2014/main" id="{F3DCB521-C918-4428-9EA8-698A7BD9C795}"/>
+              </a:ext>
+            </a:extLst>
+          </p:cNvPr>
+          <p:cNvSpPr>
+            <a:spLocks noGrp="1"/>
+          </p:cNvSpPr>
+          <p:nvPr>
+            <p:ph idx="1"/>
+          </p:nvPr>
+        </p:nvSpPr>
+        <p:spPr/>
+        <p:txBody>
+          <a:bodyPr/>
+          <a:lstStyle/>
+          <a:p>
+            <a:r>
+              <a:rPr lang="en-US" dirty="0"/>
+              <a:t>Working proof of concept</a:t>
+            </a:r>
+          </a:p>
+          <a:p>
+            <a:r>
+              <a:rPr lang="en-US" dirty="0"/>
+              <a:t>Self contained Docker-container</a:t>
+            </a:r>
+          </a:p>
+          <a:p>
+            <a:r>
+              <a:rPr lang="en-US" dirty="0"/>
+              <a:t>10 clients, 2 nodes, 30 sec interval</a:t>
+            </a:r>
+          </a:p>
+          <a:p>
+            <a:pPr marL="0" indent="0">
+              <a:buNone/>
+            </a:pPr>
+            <a:endParaRPr lang="en-US" dirty="0"/>
+          </a:p>
+        </p:txBody>
+      </p:sp>
+    </p:spTree>
+    <p:extLst>
+      <p:ext uri="{BB962C8B-B14F-4D97-AF65-F5344CB8AC3E}">
+        <p14:creationId xmlns:p14="http://schemas.microsoft.com/office/powerpoint/2010/main" val="1672612928"/>
+      </p:ext>
+    </p:extLst>
+  </p:cSld>
+  <p:clrMapOvr>
+    <a:masterClrMapping/>
+  </p:clrMapOvr>
+</p:sld>
+</file>
+
+<file path=ppt/slides/slide11.xml><?xml version="1.0" encoding="utf-8"?>
+<p:sld xmlns:a="http://schemas.openxmlformats.org/drawingml/2006/main" xmlns:r="http://schemas.openxmlformats.org/officeDocument/2006/relationships" xmlns:p="http://schemas.openxmlformats.org/presentationml/2006/main">
+  <p:cSld>
+    <p:spTree>
+      <p:nvGrpSpPr>
+        <p:cNvPr id="1" name=""/>
+        <p:cNvGrpSpPr/>
+        <p:nvPr/>
+      </p:nvGrpSpPr>
+      <p:grpSpPr>
+        <a:xfrm>
+          <a:off x="0" y="0"/>
+          <a:ext cx="0" cy="0"/>
+          <a:chOff x="0" y="0"/>
+          <a:chExt cx="0" cy="0"/>
+        </a:xfrm>
+      </p:grpSpPr>
+      <p:sp>
+        <p:nvSpPr>
           <p:cNvPr id="2" name="Title 1"/>
           <p:cNvSpPr>
             <a:spLocks noGrp="1"/>
@@ -3832,7 +3937,7 @@
 </p:sld>
 </file>
 
-<file path=ppt/slides/slide11.xml><?xml version="1.0" encoding="utf-8"?>
+<file path=ppt/slides/slide12.xml><?xml version="1.0" encoding="utf-8"?>
 <p:sld xmlns:a="http://schemas.openxmlformats.org/drawingml/2006/main" xmlns:r="http://schemas.openxmlformats.org/officeDocument/2006/relationships" xmlns:p="http://schemas.openxmlformats.org/presentationml/2006/main">
   <p:cSld>
     <p:spTree>

</xml_diff>

<commit_message>
Added screenshot to powerpoint
</commit_message>
<xml_diff>
--- a/Documentation/eXchains.pptx
+++ b/Documentation/eXchains.pptx
@@ -6,10 +6,10 @@
     <p:sldMasterId id="2147483660" r:id="rId2"/>
   </p:sldMasterIdLst>
   <p:notesMasterIdLst>
-    <p:notesMasterId r:id="rId15"/>
+    <p:notesMasterId r:id="rId16"/>
   </p:notesMasterIdLst>
   <p:handoutMasterIdLst>
-    <p:handoutMasterId r:id="rId16"/>
+    <p:handoutMasterId r:id="rId17"/>
   </p:handoutMasterIdLst>
   <p:sldIdLst>
     <p:sldId id="277" r:id="rId3"/>
@@ -22,8 +22,9 @@
     <p:sldId id="279" r:id="rId10"/>
     <p:sldId id="273" r:id="rId11"/>
     <p:sldId id="281" r:id="rId12"/>
-    <p:sldId id="274" r:id="rId13"/>
-    <p:sldId id="275" r:id="rId14"/>
+    <p:sldId id="282" r:id="rId13"/>
+    <p:sldId id="274" r:id="rId14"/>
+    <p:sldId id="275" r:id="rId15"/>
   </p:sldIdLst>
   <p:sldSz cx="9144000" cy="5143500" type="screen16x9"/>
   <p:notesSz cx="6858000" cy="9144000"/>
@@ -785,7 +786,13 @@
           <a:p>
             <a:r>
               <a:rPr lang="en-US" noProof="0" dirty="0"/>
-              <a:t>The problem we were assigned is to create a decentralized energy market. This is a very relevant topic, we as a society are adopting more sustainable energy sources such as solar panels, wind turbines and renewable sources. Besides that people are also starting to adopt more electrical vehicles and electrical only houses. </a:t>
+              <a:t>The problem we were assigned is to create a decentralized energy market. This is a very relevant topic, we as a society are adopting more sustainable energy sources such as solar panels, wind turbines and renewable sources. </a:t>
+            </a:r>
+          </a:p>
+          <a:p>
+            <a:r>
+              <a:rPr lang="en-US" noProof="0" dirty="0"/>
+              <a:t>Besides that people are also starting to adopt more electrical vehicles and electrical only houses. </a:t>
             </a:r>
           </a:p>
           <a:p>
@@ -828,7 +835,7 @@
             </a:r>
             <a:r>
               <a:rPr lang="en-US" noProof="0" dirty="0"/>
-              <a:t>: the TSO (in our case </a:t>
+              <a:t>: the TSO (Transmission System Operator); in our case </a:t>
             </a:r>
             <a:r>
               <a:rPr lang="en-US" noProof="0" dirty="0" err="1"/>
@@ -929,7 +936,7 @@
           <a:p>
             <a:r>
               <a:rPr lang="en-US" dirty="0"/>
-              <a:t>Besides the fact that the input and output has to be balanced there are also limitations to the capacity of the physical grid</a:t>
+              <a:t>Besides the fact that the input and output has to be balanced there are also limitations to the capacity of the physical grid.</a:t>
             </a:r>
           </a:p>
           <a:p>
@@ -938,15 +945,39 @@
           <a:p>
             <a:r>
               <a:rPr lang="en-US" dirty="0"/>
-              <a:t>Even when, on the top level (where the TSO operates) everything is in balance, there still might be a problem. If one cluster has a large sur-plus and another has a big shortage then there is the possibility that </a:t>
+              <a:t>The physical grid is </a:t>
             </a:r>
             <a:r>
               <a:rPr lang="en-US" dirty="0" err="1"/>
-              <a:t>eventhough</a:t>
+              <a:t>layed</a:t>
             </a:r>
             <a:r>
               <a:rPr lang="en-US" dirty="0"/>
-              <a:t> the grid is balance we’re overloading the physical grid by inter-cluster energy flows</a:t>
+              <a:t>-out in such a way that, on the lowest level we have a set of houses (e.g. a street) is connected to the same physical cable at 230 volts.</a:t>
+            </a:r>
+          </a:p>
+          <a:p>
+            <a:r>
+              <a:rPr lang="en-US" dirty="0"/>
+              <a:t>-&gt;Several of these are clustered together in a transformer houses all around the city, which on their turn are connected to a 10 kilo volt net.</a:t>
+            </a:r>
+          </a:p>
+          <a:p>
+            <a:r>
+              <a:rPr lang="en-US" dirty="0"/>
+              <a:t>-&gt; These 10 kilovolts then connect to larger transformer stations which connect multiple cities on a 50KV net.</a:t>
+            </a:r>
+          </a:p>
+          <a:p>
+            <a:r>
+              <a:rPr lang="en-US" dirty="0"/>
+              <a:t>-&gt; These are then again clustered together and transformed, to connect nets across the country,  (110 -150 KV)</a:t>
+            </a:r>
+          </a:p>
+          <a:p>
+            <a:r>
+              <a:rPr lang="en-US" dirty="0"/>
+              <a:t>-&gt;and then transformed up again to be part of a nation wide and international net. (220-380 KV)</a:t>
             </a:r>
           </a:p>
           <a:p>
@@ -955,7 +986,16 @@
           <a:p>
             <a:r>
               <a:rPr lang="en-US" dirty="0"/>
-              <a:t>One solution to prevent this while still maintaining a balanced grid is to first only start balancing within your own grid and try to solve the imbalance as much as possible. And only then escalate the imbalance to and try and solve it at a higher level. This works as at ever increasing levels bigger players keep joining.</a:t>
+              <a:t>Even when, on the top level (where the TSO operates) everything is in balance, there still might be a problem. If one cluster has a large sur-plus and another has a big shortage then there is the possibility that even though the grid is balance we’re overloading the physical grid by inter-cluster energy flows</a:t>
+            </a:r>
+          </a:p>
+          <a:p>
+            <a:endParaRPr lang="en-US" dirty="0"/>
+          </a:p>
+          <a:p>
+            <a:r>
+              <a:rPr lang="en-US" dirty="0"/>
+              <a:t>One solution to prevent this while still maintaining a balanced grid is to first only start balancing within your own grid and try to solve the imbalance as much as possible. And only then escalate the imbalance to and try and solve it at a higher level. This works as at ever increasing levels bigger players keep joining. This also has the benefit that energy does not have to move from one side of the country to the other which reduces transport losses</a:t>
             </a:r>
           </a:p>
           <a:p>
@@ -1057,9 +1097,30 @@
                 <a:ea typeface="+mn-ea"/>
                 <a:cs typeface="+mn-cs"/>
               </a:rPr>
-              <a:t>Drop-in addition; can't cut people off, different price production consumption, maybe even cap the production (very likely in the future; 2020). </a:t>
-            </a:r>
-            <a:br>
+              <a:t>The balancing per cluster is done using a market based system, where people place bids and requests for energy.</a:t>
+            </a:r>
+          </a:p>
+          <a:p>
+            <a:pPr marL="171450" indent="-171450">
+              <a:buFont typeface="Arial" panose="020B0604020202020204" pitchFamily="34" charset="0"/>
+              <a:buChar char="•"/>
+            </a:pPr>
+            <a:endParaRPr lang="en-US" sz="1200" b="0" i="0" u="none" strike="noStrike" kern="1200" dirty="0">
+              <a:solidFill>
+                <a:schemeClr val="tx1"/>
+              </a:solidFill>
+              <a:effectLst/>
+              <a:latin typeface="+mn-lt"/>
+              <a:ea typeface="+mn-ea"/>
+              <a:cs typeface="+mn-cs"/>
+            </a:endParaRPr>
+          </a:p>
+          <a:p>
+            <a:pPr marL="171450" indent="-171450">
+              <a:buFont typeface="Arial" panose="020B0604020202020204" pitchFamily="34" charset="0"/>
+              <a:buChar char="•"/>
+            </a:pPr>
+            <a:r>
               <a:rPr lang="en-US" sz="1200" b="0" i="0" u="none" strike="noStrike" kern="1200" dirty="0">
                 <a:solidFill>
                   <a:schemeClr val="tx1"/>
@@ -1069,8 +1130,15 @@
                 <a:ea typeface="+mn-ea"/>
                 <a:cs typeface="+mn-cs"/>
               </a:rPr>
-            </a:br>
-            <a:br>
+              <a:t>Drop-in addition; can't cut people off, </a:t>
+            </a:r>
+          </a:p>
+          <a:p>
+            <a:pPr marL="628650" lvl="1" indent="-171450">
+              <a:buFont typeface="Arial" panose="020B0604020202020204" pitchFamily="34" charset="0"/>
+              <a:buChar char="•"/>
+            </a:pPr>
+            <a:r>
               <a:rPr lang="en-US" sz="1200" b="0" i="0" u="none" strike="noStrike" kern="1200" dirty="0">
                 <a:solidFill>
                   <a:schemeClr val="tx1"/>
@@ -1080,7 +1148,47 @@
                 <a:ea typeface="+mn-ea"/>
                 <a:cs typeface="+mn-cs"/>
               </a:rPr>
-            </a:br>
+              <a:t>different price production consumption, </a:t>
+            </a:r>
+          </a:p>
+          <a:p>
+            <a:pPr marL="628650" lvl="1" indent="-171450">
+              <a:buFont typeface="Arial" panose="020B0604020202020204" pitchFamily="34" charset="0"/>
+              <a:buChar char="•"/>
+            </a:pPr>
+            <a:r>
+              <a:rPr lang="en-US" sz="1200" b="0" i="0" u="none" strike="noStrike" kern="1200" dirty="0">
+                <a:solidFill>
+                  <a:schemeClr val="tx1"/>
+                </a:solidFill>
+                <a:effectLst/>
+                <a:latin typeface="+mn-lt"/>
+                <a:ea typeface="+mn-ea"/>
+                <a:cs typeface="+mn-cs"/>
+              </a:rPr>
+              <a:t>maybe even cap the production (very likely in the future; 2020). </a:t>
+            </a:r>
+          </a:p>
+          <a:p>
+            <a:pPr marL="457200" lvl="1" indent="0">
+              <a:buFont typeface="Arial" panose="020B0604020202020204" pitchFamily="34" charset="0"/>
+              <a:buNone/>
+            </a:pPr>
+            <a:endParaRPr lang="en-US" sz="1200" b="0" i="0" u="none" strike="noStrike" kern="1200" dirty="0">
+              <a:solidFill>
+                <a:schemeClr val="tx1"/>
+              </a:solidFill>
+              <a:effectLst/>
+              <a:latin typeface="+mn-lt"/>
+              <a:ea typeface="+mn-ea"/>
+              <a:cs typeface="+mn-cs"/>
+            </a:endParaRPr>
+          </a:p>
+          <a:p>
+            <a:pPr marL="171450" indent="-171450">
+              <a:buFont typeface="Arial" panose="020B0604020202020204" pitchFamily="34" charset="0"/>
+              <a:buChar char="•"/>
+            </a:pPr>
             <a:r>
               <a:rPr lang="en-US" sz="1200" b="0" i="0" u="none" strike="noStrike" kern="1200" dirty="0">
                 <a:solidFill>
@@ -3873,6 +3981,94 @@
       </p:grpSpPr>
       <p:sp>
         <p:nvSpPr>
+          <p:cNvPr id="2" name="Title 1">
+            <a:extLst>
+              <a:ext uri="{FF2B5EF4-FFF2-40B4-BE49-F238E27FC236}">
+                <a16:creationId xmlns:a16="http://schemas.microsoft.com/office/drawing/2014/main" id="{3A10507A-BBB0-4E87-A85D-286E2E9E79EF}"/>
+              </a:ext>
+            </a:extLst>
+          </p:cNvPr>
+          <p:cNvSpPr>
+            <a:spLocks noGrp="1"/>
+          </p:cNvSpPr>
+          <p:nvPr>
+            <p:ph type="title"/>
+          </p:nvPr>
+        </p:nvSpPr>
+        <p:spPr/>
+        <p:txBody>
+          <a:bodyPr/>
+          <a:lstStyle/>
+          <a:p>
+            <a:r>
+              <a:rPr lang="en-US"/>
+              <a:t>Results:</a:t>
+            </a:r>
+            <a:endParaRPr lang="en-US" dirty="0"/>
+          </a:p>
+        </p:txBody>
+      </p:sp>
+      <p:pic>
+        <p:nvPicPr>
+          <p:cNvPr id="7" name="Content Placeholder 6">
+            <a:extLst>
+              <a:ext uri="{FF2B5EF4-FFF2-40B4-BE49-F238E27FC236}">
+                <a16:creationId xmlns:a16="http://schemas.microsoft.com/office/drawing/2014/main" id="{0A1562DA-2E00-419D-8267-0BA8F698D150}"/>
+              </a:ext>
+            </a:extLst>
+          </p:cNvPr>
+          <p:cNvPicPr>
+            <a:picLocks noGrp="1" noChangeAspect="1"/>
+          </p:cNvPicPr>
+          <p:nvPr>
+            <p:ph idx="1"/>
+          </p:nvPr>
+        </p:nvPicPr>
+        <p:blipFill>
+          <a:blip r:embed="rId2"/>
+          <a:stretch>
+            <a:fillRect/>
+          </a:stretch>
+        </p:blipFill>
+        <p:spPr>
+          <a:xfrm>
+            <a:off x="1679982" y="952713"/>
+            <a:ext cx="7342990" cy="3896375"/>
+          </a:xfrm>
+        </p:spPr>
+      </p:pic>
+    </p:spTree>
+    <p:extLst>
+      <p:ext uri="{BB962C8B-B14F-4D97-AF65-F5344CB8AC3E}">
+        <p14:creationId xmlns:p14="http://schemas.microsoft.com/office/powerpoint/2010/main" val="2442030780"/>
+      </p:ext>
+    </p:extLst>
+  </p:cSld>
+  <p:clrMapOvr>
+    <a:masterClrMapping/>
+  </p:clrMapOvr>
+</p:sld>
+</file>
+
+<file path=ppt/slides/slide12.xml><?xml version="1.0" encoding="utf-8"?>
+<p:sld xmlns:a="http://schemas.openxmlformats.org/drawingml/2006/main" xmlns:r="http://schemas.openxmlformats.org/officeDocument/2006/relationships" xmlns:p="http://schemas.openxmlformats.org/presentationml/2006/main">
+  <p:cSld>
+    <p:spTree>
+      <p:nvGrpSpPr>
+        <p:cNvPr id="1" name=""/>
+        <p:cNvGrpSpPr/>
+        <p:nvPr/>
+      </p:nvGrpSpPr>
+      <p:grpSpPr>
+        <a:xfrm>
+          <a:off x="0" y="0"/>
+          <a:ext cx="0" cy="0"/>
+          <a:chOff x="0" y="0"/>
+          <a:chExt cx="0" cy="0"/>
+        </a:xfrm>
+      </p:grpSpPr>
+      <p:sp>
+        <p:nvSpPr>
           <p:cNvPr id="2" name="Title 1"/>
           <p:cNvSpPr>
             <a:spLocks noGrp="1"/>
@@ -3890,7 +4086,7 @@
           <a:p>
             <a:r>
               <a:rPr lang="en-US" dirty="0"/>
-              <a:t>Demo</a:t>
+              <a:t>Demo:</a:t>
             </a:r>
           </a:p>
         </p:txBody>
@@ -3937,7 +4133,7 @@
 </p:sld>
 </file>
 
-<file path=ppt/slides/slide12.xml><?xml version="1.0" encoding="utf-8"?>
+<file path=ppt/slides/slide13.xml><?xml version="1.0" encoding="utf-8"?>
 <p:sld xmlns:a="http://schemas.openxmlformats.org/drawingml/2006/main" xmlns:r="http://schemas.openxmlformats.org/officeDocument/2006/relationships" xmlns:p="http://schemas.openxmlformats.org/presentationml/2006/main">
   <p:cSld>
     <p:spTree>
@@ -4090,13 +4286,13 @@
           <a:p>
             <a:r>
               <a:rPr lang="en-US" dirty="0"/>
+              <a:t>intermittent sources vs old fashioned powerplant-household configuration</a:t>
+            </a:r>
+          </a:p>
+          <a:p>
+            <a:r>
+              <a:rPr lang="en-US" dirty="0"/>
               <a:t>Currently the TSO responsible for balancing</a:t>
-            </a:r>
-          </a:p>
-          <a:p>
-            <a:r>
-              <a:rPr lang="en-US" dirty="0"/>
-              <a:t>intermittent sources vs old fashioned powerplant-household configuration</a:t>
             </a:r>
           </a:p>
           <a:p>

</xml_diff>